<commit_message>
Add link to embedded C coding standard
</commit_message>
<xml_diff>
--- a/ece-18-642/lec-01-to-04/hw04/HW04_NGUYEN_Todd_noid.pptx
+++ b/ece-18-642/lec-01-to-04/hw04/HW04_NGUYEN_Todd_noid.pptx
@@ -3416,11 +3416,38 @@
           <a:p>
             <a:r>
               <a:rPr lang="en-US" sz="2000" dirty="0" smtClean="0"/>
-              <a:t>Section 5.1 – 5.5 (Dat</a:t>
+              <a:t>Link</a:t>
+            </a:r>
+            <a:r>
+              <a:rPr lang="en-US" sz="2000" dirty="0"/>
+              <a:t>: </a:t>
+            </a:r>
+            <a:r>
+              <a:rPr lang="en-US" sz="2000" dirty="0">
+                <a:hlinkClick r:id="rId2"/>
+              </a:rPr>
+              <a:t>https://</a:t>
+            </a:r>
+            <a:r>
+              <a:rPr lang="en-US" sz="2000" dirty="0" smtClean="0">
+                <a:hlinkClick r:id="rId2"/>
+              </a:rPr>
+              <a:t>barrgroup.com/Embedded-Systems/Books/Embedded-C-Coding-Standard</a:t>
             </a:r>
             <a:r>
               <a:rPr lang="en-US" sz="2000" dirty="0" smtClean="0"/>
-              <a:t>a Type Rules)</a:t>
+              <a:t> </a:t>
+            </a:r>
+            <a:endParaRPr lang="en-US" sz="2000" dirty="0" smtClean="0"/>
+          </a:p>
+          <a:p>
+            <a:r>
+              <a:rPr lang="en-US" sz="2000" dirty="0" smtClean="0"/>
+              <a:t>Section </a:t>
+            </a:r>
+            <a:r>
+              <a:rPr lang="en-US" sz="2000" dirty="0" smtClean="0"/>
+              <a:t>5.1 – 5.5 (Data Type Rules)</a:t>
             </a:r>
           </a:p>
           <a:p>
@@ -3508,13 +3535,8 @@
           <a:p>
             <a:r>
               <a:rPr lang="en-US" sz="2000" dirty="0" smtClean="0"/>
-              <a:t>I disagree with this as sometimes you must do floating point arithmetic, and as programmers we cannot use integers only all the time. A good alternative is to compare a floating point to a delta instead of comparing it against an </a:t>
-            </a:r>
-            <a:r>
-              <a:rPr lang="en-US" sz="2000" smtClean="0"/>
-              <a:t>actual value.</a:t>
-            </a:r>
-            <a:endParaRPr lang="en-US" sz="2000" dirty="0" smtClean="0"/>
+              <a:t>I disagree with this as sometimes you must do floating point arithmetic, and as programmers we cannot use integers only all the time. A good alternative is to compare a floating point to a delta instead of comparing it against an actual value.</a:t>
+            </a:r>
           </a:p>
           <a:p>
             <a:endParaRPr lang="en-US" sz="2000" dirty="0" smtClean="0"/>

</xml_diff>